<commit_message>
Merged revision(s) 769-775 from branches/minimization_1:
git-svn-id: https://roadrunnerlib.googlecode.com/svn/trunk@918 c0027639-9190-0b57-01eb-f09a03790dae
</commit_message>
<xml_diff>
--- a/docs/powerPoints/MultiThreading_1.pptx
+++ b/docs/powerPoints/MultiThreading_1.pptx
@@ -340,7 +340,7 @@
             <a:fld id="{B61BEF0D-F0BB-DE4B-95CE-6DB70DBA9567}" type="datetimeFigureOut">
               <a:rPr lang="en-US" smtClean="0"/>
               <a:pPr/>
-              <a:t>4/1/2013</a:t>
+              <a:t>4/3/2013</a:t>
             </a:fld>
             <a:endParaRPr lang="en-US"/>
           </a:p>
@@ -778,7 +778,7 @@
             <a:fld id="{B61BEF0D-F0BB-DE4B-95CE-6DB70DBA9567}" type="datetimeFigureOut">
               <a:rPr lang="en-US" smtClean="0"/>
               <a:pPr/>
-              <a:t>4/1/2013</a:t>
+              <a:t>4/3/2013</a:t>
             </a:fld>
             <a:endParaRPr lang="en-US"/>
           </a:p>
@@ -1030,7 +1030,7 @@
             <a:fld id="{B61BEF0D-F0BB-DE4B-95CE-6DB70DBA9567}" type="datetimeFigureOut">
               <a:rPr lang="en-US" smtClean="0"/>
               <a:pPr/>
-              <a:t>4/1/2013</a:t>
+              <a:t>4/3/2013</a:t>
             </a:fld>
             <a:endParaRPr lang="en-US"/>
           </a:p>
@@ -1340,7 +1340,7 @@
             <a:fld id="{B61BEF0D-F0BB-DE4B-95CE-6DB70DBA9567}" type="datetimeFigureOut">
               <a:rPr lang="en-US" smtClean="0"/>
               <a:pPr/>
-              <a:t>4/1/2013</a:t>
+              <a:t>4/3/2013</a:t>
             </a:fld>
             <a:endParaRPr lang="en-US"/>
           </a:p>
@@ -1660,7 +1660,7 @@
             <a:fld id="{B61BEF0D-F0BB-DE4B-95CE-6DB70DBA9567}" type="datetimeFigureOut">
               <a:rPr lang="en-US" smtClean="0"/>
               <a:pPr/>
-              <a:t>4/1/2013</a:t>
+              <a:t>4/3/2013</a:t>
             </a:fld>
             <a:endParaRPr lang="en-US"/>
           </a:p>
@@ -1964,7 +1964,7 @@
             <a:fld id="{B61BEF0D-F0BB-DE4B-95CE-6DB70DBA9567}" type="datetimeFigureOut">
               <a:rPr lang="en-US" smtClean="0"/>
               <a:pPr/>
-              <a:t>4/1/2013</a:t>
+              <a:t>4/3/2013</a:t>
             </a:fld>
             <a:endParaRPr lang="en-US"/>
           </a:p>
@@ -2333,7 +2333,7 @@
             <a:fld id="{B61BEF0D-F0BB-DE4B-95CE-6DB70DBA9567}" type="datetimeFigureOut">
               <a:rPr lang="en-US" smtClean="0"/>
               <a:pPr/>
-              <a:t>4/1/2013</a:t>
+              <a:t>4/3/2013</a:t>
             </a:fld>
             <a:endParaRPr lang="en-US"/>
           </a:p>
@@ -2509,7 +2509,7 @@
             <a:fld id="{B61BEF0D-F0BB-DE4B-95CE-6DB70DBA9567}" type="datetimeFigureOut">
               <a:rPr lang="en-US" smtClean="0"/>
               <a:pPr/>
-              <a:t>4/1/2013</a:t>
+              <a:t>4/3/2013</a:t>
             </a:fld>
             <a:endParaRPr lang="en-US"/>
           </a:p>
@@ -2691,7 +2691,7 @@
             <a:fld id="{B61BEF0D-F0BB-DE4B-95CE-6DB70DBA9567}" type="datetimeFigureOut">
               <a:rPr lang="en-US" smtClean="0"/>
               <a:pPr/>
-              <a:t>4/1/2013</a:t>
+              <a:t>4/3/2013</a:t>
             </a:fld>
             <a:endParaRPr lang="en-US"/>
           </a:p>
@@ -2863,7 +2863,7 @@
             <a:fld id="{B61BEF0D-F0BB-DE4B-95CE-6DB70DBA9567}" type="datetimeFigureOut">
               <a:rPr lang="en-US" smtClean="0"/>
               <a:pPr/>
-              <a:t>4/1/2013</a:t>
+              <a:t>4/3/2013</a:t>
             </a:fld>
             <a:endParaRPr lang="en-US"/>
           </a:p>
@@ -3115,7 +3115,7 @@
             <a:fld id="{B61BEF0D-F0BB-DE4B-95CE-6DB70DBA9567}" type="datetimeFigureOut">
               <a:rPr lang="en-US" smtClean="0"/>
               <a:pPr/>
-              <a:t>4/1/2013</a:t>
+              <a:t>4/3/2013</a:t>
             </a:fld>
             <a:endParaRPr lang="en-US"/>
           </a:p>
@@ -3353,7 +3353,7 @@
             <a:fld id="{B61BEF0D-F0BB-DE4B-95CE-6DB70DBA9567}" type="datetimeFigureOut">
               <a:rPr lang="en-US" smtClean="0"/>
               <a:pPr/>
-              <a:t>4/1/2013</a:t>
+              <a:t>4/3/2013</a:t>
             </a:fld>
             <a:endParaRPr lang="en-US"/>
           </a:p>
@@ -3737,7 +3737,7 @@
             <a:fld id="{B61BEF0D-F0BB-DE4B-95CE-6DB70DBA9567}" type="datetimeFigureOut">
               <a:rPr lang="en-US" smtClean="0"/>
               <a:pPr/>
-              <a:t>4/1/2013</a:t>
+              <a:t>4/3/2013</a:t>
             </a:fld>
             <a:endParaRPr lang="en-US"/>
           </a:p>
@@ -3857,7 +3857,7 @@
             <a:fld id="{B61BEF0D-F0BB-DE4B-95CE-6DB70DBA9567}" type="datetimeFigureOut">
               <a:rPr lang="en-US" smtClean="0"/>
               <a:pPr/>
-              <a:t>4/1/2013</a:t>
+              <a:t>4/3/2013</a:t>
             </a:fld>
             <a:endParaRPr lang="en-US"/>
           </a:p>
@@ -3954,7 +3954,7 @@
             <a:fld id="{B61BEF0D-F0BB-DE4B-95CE-6DB70DBA9567}" type="datetimeFigureOut">
               <a:rPr lang="en-US" smtClean="0"/>
               <a:pPr/>
-              <a:t>4/1/2013</a:t>
+              <a:t>4/3/2013</a:t>
             </a:fld>
             <a:endParaRPr lang="en-US"/>
           </a:p>
@@ -4211,7 +4211,7 @@
             <a:fld id="{B61BEF0D-F0BB-DE4B-95CE-6DB70DBA9567}" type="datetimeFigureOut">
               <a:rPr lang="en-US" smtClean="0"/>
               <a:pPr/>
-              <a:t>4/1/2013</a:t>
+              <a:t>4/3/2013</a:t>
             </a:fld>
             <a:endParaRPr lang="en-US"/>
           </a:p>
@@ -4496,7 +4496,7 @@
             <a:fld id="{B61BEF0D-F0BB-DE4B-95CE-6DB70DBA9567}" type="datetimeFigureOut">
               <a:rPr lang="en-US" smtClean="0"/>
               <a:pPr/>
-              <a:t>4/1/2013</a:t>
+              <a:t>4/3/2013</a:t>
             </a:fld>
             <a:endParaRPr lang="en-US"/>
           </a:p>
@@ -4904,7 +4904,7 @@
             <a:fld id="{B61BEF0D-F0BB-DE4B-95CE-6DB70DBA9567}" type="datetimeFigureOut">
               <a:rPr lang="en-US" smtClean="0"/>
               <a:pPr/>
-              <a:t>4/1/2013</a:t>
+              <a:t>4/3/2013</a:t>
             </a:fld>
             <a:endParaRPr lang="en-US"/>
           </a:p>
@@ -5496,13 +5496,8 @@
             </a:pPr>
             <a:r>
               <a:rPr lang="en-US" dirty="0" smtClean="0"/>
-              <a:t>Handles and </a:t>
-            </a:r>
-            <a:r>
-              <a:rPr lang="en-US" dirty="0" smtClean="0"/>
-              <a:t>API Functions</a:t>
-            </a:r>
-            <a:endParaRPr lang="en-US" dirty="0" smtClean="0"/>
+              <a:t>Handles and API Functions</a:t>
+            </a:r>
           </a:p>
           <a:p>
             <a:pPr marL="800100" lvl="1" indent="-342900" algn="l">
@@ -5513,7 +5508,6 @@
               <a:rPr lang="en-US" dirty="0" smtClean="0"/>
               <a:t>A Simple Example</a:t>
             </a:r>
-            <a:endParaRPr lang="en-US" dirty="0" smtClean="0"/>
           </a:p>
         </p:txBody>
       </p:sp>
@@ -5629,15 +5623,7 @@
             </a:r>
             <a:r>
               <a:rPr lang="en-US" dirty="0" smtClean="0"/>
-              <a:t>Handle		</a:t>
-            </a:r>
-            <a:r>
-              <a:rPr lang="en-US" dirty="0" smtClean="0"/>
-              <a:t>	– </a:t>
-            </a:r>
-            <a:r>
-              <a:rPr lang="en-US" dirty="0" smtClean="0"/>
-              <a:t>Handle to a list of RoadRunner instances</a:t>
+              <a:t>Handle			– Handle to a list of RoadRunner instances</a:t>
             </a:r>
           </a:p>
           <a:p>
@@ -5651,15 +5637,7 @@
             </a:r>
             <a:r>
               <a:rPr lang="en-US" dirty="0" smtClean="0"/>
-              <a:t>ndle 			</a:t>
-            </a:r>
-            <a:r>
-              <a:rPr lang="en-US" dirty="0" smtClean="0"/>
-              <a:t>		– </a:t>
-            </a:r>
-            <a:r>
-              <a:rPr lang="en-US" dirty="0" smtClean="0"/>
-              <a:t>Handle to a RoadRunner Job</a:t>
+              <a:t>ndle 					– Handle to a RoadRunner Job</a:t>
             </a:r>
           </a:p>
           <a:p>
@@ -5673,15 +5651,7 @@
             </a:r>
             <a:r>
               <a:rPr lang="en-US" dirty="0" smtClean="0"/>
-              <a:t>ndle 			</a:t>
-            </a:r>
-            <a:r>
-              <a:rPr lang="en-US" dirty="0" smtClean="0"/>
-              <a:t>		– </a:t>
-            </a:r>
-            <a:r>
-              <a:rPr lang="en-US" dirty="0" smtClean="0"/>
-              <a:t>Handle to RoadRunner Jobs</a:t>
+              <a:t>ndle 					– Handle to RoadRunner Jobs</a:t>
             </a:r>
           </a:p>
           <a:p>
@@ -5742,11 +5712,7 @@
             </a:r>
             <a:r>
               <a:rPr lang="en-US" dirty="0" smtClean="0"/>
-              <a:t> instance </a:t>
-            </a:r>
-            <a:r>
-              <a:rPr lang="en-US" dirty="0" smtClean="0"/>
-              <a:t>functions	</a:t>
+              <a:t> instance functions	</a:t>
             </a:r>
             <a:endParaRPr lang="en-US" dirty="0"/>
           </a:p>
@@ -5806,7 +5772,15 @@
             </a:r>
             <a:r>
               <a:rPr lang="en-US" sz="1400" dirty="0" smtClean="0"/>
-              <a:t> h,  const char* </a:t>
+              <a:t> h, </a:t>
+            </a:r>
+            <a:r>
+              <a:rPr lang="en-US" sz="1400" dirty="0" smtClean="0"/>
+              <a:t>char</a:t>
+            </a:r>
+            <a:r>
+              <a:rPr lang="en-US" sz="1400" dirty="0" smtClean="0"/>
+              <a:t>* </a:t>
             </a:r>
             <a:r>
               <a:rPr lang="en-US" sz="1400" dirty="0" err="1" smtClean="0"/>
@@ -5831,8 +5805,12 @@
               <a:t>(</a:t>
             </a:r>
             <a:r>
+              <a:rPr lang="en-US" sz="1400" dirty="0" err="1" smtClean="0"/>
+              <a:t>RRHandle</a:t>
+            </a:r>
+            <a:r>
               <a:rPr lang="en-US" sz="1400" dirty="0" smtClean="0"/>
-              <a:t>RRInstanceHandle </a:t>
+              <a:t> </a:t>
             </a:r>
             <a:r>
               <a:rPr lang="en-US" sz="1400" dirty="0" err="1" smtClean="0"/>
@@ -5845,16 +5823,83 @@
           </a:p>
           <a:p>
             <a:r>
+              <a:rPr lang="en-US" sz="2000" dirty="0" err="1"/>
+              <a:t>RRJobHandle</a:t>
+            </a:r>
+            <a:r>
+              <a:rPr lang="en-US" sz="2000" dirty="0"/>
+              <a:t> 			</a:t>
+            </a:r>
+            <a:r>
+              <a:rPr lang="en-US" sz="2000" dirty="0" err="1" smtClean="0"/>
+              <a:t>simulateJobEx</a:t>
+            </a:r>
+            <a:r>
+              <a:rPr lang="en-US" sz="2000" dirty="0" smtClean="0"/>
+              <a:t>(</a:t>
+            </a:r>
+            <a:r>
+              <a:rPr lang="en-US" sz="1400" dirty="0" err="1" smtClean="0"/>
+              <a:t>RRHandle</a:t>
+            </a:r>
+            <a:r>
+              <a:rPr lang="en-US" sz="1400" dirty="0" smtClean="0"/>
+              <a:t> </a:t>
+            </a:r>
+            <a:r>
+              <a:rPr lang="en-US" sz="1400" dirty="0" err="1" smtClean="0"/>
+              <a:t>ih</a:t>
+            </a:r>
+            <a:r>
+              <a:rPr lang="en-US" sz="1400" dirty="0" smtClean="0"/>
+              <a:t>, double&amp; </a:t>
+            </a:r>
+            <a:r>
+              <a:rPr lang="en-US" sz="1400" dirty="0" err="1" smtClean="0"/>
+              <a:t>startTime</a:t>
+            </a:r>
+            <a:r>
+              <a:rPr lang="en-US" sz="1400" dirty="0" smtClean="0"/>
+              <a:t>, double&amp; </a:t>
+            </a:r>
+            <a:r>
+              <a:rPr lang="en-US" sz="1400" dirty="0" err="1" smtClean="0"/>
+              <a:t>endtime</a:t>
+            </a:r>
+            <a:r>
+              <a:rPr lang="en-US" sz="1400" dirty="0" smtClean="0"/>
+              <a:t>, </a:t>
+            </a:r>
+            <a:r>
+              <a:rPr lang="en-US" sz="1400" dirty="0" err="1" smtClean="0"/>
+              <a:t>int</a:t>
+            </a:r>
+            <a:r>
+              <a:rPr lang="en-US" sz="1400" dirty="0" smtClean="0"/>
+              <a:t>&amp; </a:t>
+            </a:r>
+            <a:r>
+              <a:rPr lang="en-US" sz="1400" dirty="0" err="1" smtClean="0"/>
+              <a:t>nrPoints</a:t>
+            </a:r>
+            <a:r>
+              <a:rPr lang="en-US" sz="2000" dirty="0" smtClean="0"/>
+              <a:t>)</a:t>
+            </a:r>
+            <a:endParaRPr lang="en-US" sz="2000" dirty="0" smtClean="0"/>
+          </a:p>
+          <a:p>
+            <a:r>
               <a:rPr lang="en-US" sz="2000" dirty="0" err="1" smtClean="0"/>
               <a:t>bool</a:t>
             </a:r>
             <a:r>
               <a:rPr lang="en-US" sz="2000" dirty="0" smtClean="0"/>
-              <a:t> 				</a:t>
+              <a:t> </a:t>
             </a:r>
             <a:r>
               <a:rPr lang="en-US" sz="2000" dirty="0" smtClean="0"/>
-              <a:t>		</a:t>
+              <a:t>						</a:t>
             </a:r>
             <a:r>
               <a:rPr lang="en-US" sz="2000" dirty="0" err="1" smtClean="0"/>
@@ -5884,11 +5929,7 @@
             </a:r>
             <a:r>
               <a:rPr lang="en-US" sz="2000" dirty="0" smtClean="0"/>
-              <a:t>				</a:t>
-            </a:r>
-            <a:r>
-              <a:rPr lang="en-US" sz="2000" dirty="0" smtClean="0"/>
-              <a:t>		</a:t>
+              <a:t>						</a:t>
             </a:r>
             <a:r>
               <a:rPr lang="en-US" sz="2000" dirty="0" err="1" smtClean="0"/>
@@ -5918,11 +5959,7 @@
             </a:r>
             <a:r>
               <a:rPr lang="en-US" sz="2000" dirty="0" smtClean="0"/>
-              <a:t>				</a:t>
-            </a:r>
-            <a:r>
-              <a:rPr lang="en-US" sz="2000" dirty="0" smtClean="0"/>
-              <a:t>		</a:t>
+              <a:t>						</a:t>
             </a:r>
             <a:r>
               <a:rPr lang="en-US" sz="2000" dirty="0" err="1" smtClean="0"/>
@@ -5933,8 +5970,12 @@
               <a:t>(</a:t>
             </a:r>
             <a:r>
+              <a:rPr lang="en-US" sz="1400" dirty="0" err="1" smtClean="0"/>
+              <a:t>RRHandle</a:t>
+            </a:r>
+            <a:r>
               <a:rPr lang="en-US" sz="1400" dirty="0" smtClean="0"/>
-              <a:t>RRInstanceHandle </a:t>
+              <a:t> </a:t>
             </a:r>
             <a:r>
               <a:rPr lang="en-US" sz="1400" dirty="0" err="1" smtClean="0"/>
@@ -5952,11 +5993,7 @@
             </a:r>
             <a:r>
               <a:rPr lang="en-US" sz="2000" dirty="0" smtClean="0"/>
-              <a:t>				</a:t>
-            </a:r>
-            <a:r>
-              <a:rPr lang="en-US" sz="2000" dirty="0" smtClean="0"/>
-              <a:t>		</a:t>
+              <a:t>						</a:t>
             </a:r>
             <a:r>
               <a:rPr lang="en-US" sz="2000" dirty="0" err="1" smtClean="0"/>
@@ -6081,11 +6118,7 @@
             </a:r>
             <a:r>
               <a:rPr lang="en-US" sz="2000" dirty="0" smtClean="0"/>
-              <a:t>				</a:t>
-            </a:r>
-            <a:r>
-              <a:rPr lang="en-US" sz="2000" dirty="0" smtClean="0"/>
-              <a:t>		</a:t>
+              <a:t>						</a:t>
             </a:r>
             <a:r>
               <a:rPr lang="en-US" sz="2000" dirty="0" err="1" smtClean="0"/>
@@ -6111,11 +6144,7 @@
           <a:p>
             <a:r>
               <a:rPr lang="en-US" sz="2000" dirty="0" smtClean="0"/>
-              <a:t>RRInstanceHandle		</a:t>
-            </a:r>
-            <a:r>
-              <a:rPr lang="en-US" sz="2000" dirty="0" smtClean="0"/>
-              <a:t>	</a:t>
+              <a:t>RRInstanceHandle			</a:t>
             </a:r>
             <a:r>
               <a:rPr lang="en-US" sz="2000" dirty="0" err="1" smtClean="0"/>
@@ -6141,11 +6170,7 @@
           <a:p>
             <a:r>
               <a:rPr lang="en-US" sz="2000" dirty="0" smtClean="0"/>
-              <a:t>RRJobsHandle 		</a:t>
-            </a:r>
-            <a:r>
-              <a:rPr lang="en-US" sz="2000" dirty="0" smtClean="0"/>
-              <a:t>	</a:t>
+              <a:t>RRJobsHandle 			</a:t>
             </a:r>
             <a:r>
               <a:rPr lang="en-US" sz="2000" dirty="0" err="1" smtClean="0"/>
@@ -6179,11 +6204,7 @@
           <a:p>
             <a:r>
               <a:rPr lang="en-US" sz="2000" dirty="0" smtClean="0"/>
-              <a:t>RRJobsHandle 		</a:t>
-            </a:r>
-            <a:r>
-              <a:rPr lang="en-US" sz="2000" dirty="0" smtClean="0"/>
-              <a:t>	</a:t>
+              <a:t>RRJobsHandle 			</a:t>
             </a:r>
             <a:r>
               <a:rPr lang="en-US" sz="2000" dirty="0" err="1" smtClean="0"/>
@@ -6195,11 +6216,7 @@
             </a:r>
             <a:r>
               <a:rPr lang="en-US" sz="1400" dirty="0" smtClean="0"/>
-              <a:t>RRInstanceListHandle </a:t>
-            </a:r>
-            <a:r>
-              <a:rPr lang="en-US" sz="1400" dirty="0" smtClean="0"/>
-              <a:t>h</a:t>
+              <a:t>RRInstanceListHandle h</a:t>
             </a:r>
             <a:r>
               <a:rPr lang="en-US" sz="2000" dirty="0" smtClean="0"/>
@@ -6213,11 +6230,7 @@
             </a:r>
             <a:r>
               <a:rPr lang="en-US" sz="2000" dirty="0" smtClean="0"/>
-              <a:t> 				</a:t>
-            </a:r>
-            <a:r>
-              <a:rPr lang="en-US" sz="2000" dirty="0" smtClean="0"/>
-              <a:t>		</a:t>
+              <a:t> 						</a:t>
             </a:r>
             <a:r>
               <a:rPr lang="en-US" sz="2000" dirty="0" err="1" smtClean="0"/>
@@ -6247,11 +6260,7 @@
             </a:r>
             <a:r>
               <a:rPr lang="en-US" sz="2000" dirty="0" smtClean="0"/>
-              <a:t>				</a:t>
-            </a:r>
-            <a:r>
-              <a:rPr lang="en-US" sz="2000" dirty="0" smtClean="0"/>
-              <a:t>		</a:t>
+              <a:t>						</a:t>
             </a:r>
             <a:r>
               <a:rPr lang="en-US" sz="2000" dirty="0" err="1" smtClean="0"/>
@@ -6281,11 +6290,7 @@
             </a:r>
             <a:r>
               <a:rPr lang="en-US" sz="2000" dirty="0" smtClean="0"/>
-              <a:t>				</a:t>
-            </a:r>
-            <a:r>
-              <a:rPr lang="en-US" sz="2000" dirty="0" smtClean="0"/>
-              <a:t>		</a:t>
+              <a:t>						</a:t>
             </a:r>
             <a:r>
               <a:rPr lang="en-US" sz="2000" dirty="0" err="1" smtClean="0"/>
@@ -6323,11 +6328,7 @@
             </a:r>
             <a:r>
               <a:rPr lang="en-US" sz="2000" dirty="0" smtClean="0"/>
-              <a:t>				</a:t>
-            </a:r>
-            <a:r>
-              <a:rPr lang="en-US" sz="2000" dirty="0" smtClean="0"/>
-              <a:t>		</a:t>
+              <a:t>						</a:t>
             </a:r>
             <a:r>
               <a:rPr lang="en-US" sz="2000" dirty="0" err="1" smtClean="0"/>
@@ -6357,11 +6358,7 @@
             </a:r>
             <a:r>
               <a:rPr lang="en-US" sz="2000" dirty="0" smtClean="0"/>
-              <a:t>				</a:t>
-            </a:r>
-            <a:r>
-              <a:rPr lang="en-US" sz="2000" dirty="0" smtClean="0"/>
-              <a:t>		</a:t>
+              <a:t>						</a:t>
             </a:r>
             <a:r>
               <a:rPr lang="en-US" sz="2000" dirty="0" err="1" smtClean="0"/>
@@ -6455,23 +6452,7 @@
           <a:p>
             <a:r>
               <a:rPr lang="en-US" dirty="0" smtClean="0"/>
-              <a:t>Python Simulation </a:t>
-            </a:r>
-            <a:r>
-              <a:rPr lang="en-US" dirty="0" smtClean="0"/>
-              <a:t>-</a:t>
-            </a:r>
-            <a:r>
-              <a:rPr lang="en-US" dirty="0" smtClean="0"/>
-              <a:t>one </a:t>
-            </a:r>
-            <a:r>
-              <a:rPr lang="en-US" dirty="0" smtClean="0"/>
-              <a:t>job in one </a:t>
-            </a:r>
-            <a:r>
-              <a:rPr lang="en-US" dirty="0" smtClean="0"/>
-              <a:t>thread</a:t>
+              <a:t>Python Simulation -one job in one thread</a:t>
             </a:r>
             <a:endParaRPr lang="en-US" dirty="0"/>
           </a:p>

</xml_diff>